<commit_message>
Update Climate Change project update week 2 (1).pptx
added short explanation with correlations
</commit_message>
<xml_diff>
--- a/Presentations/Climate Change project update week 2 (1).pptx
+++ b/Presentations/Climate Change project update week 2 (1).pptx
@@ -273,8 +273,11 @@
     </a:lvl9pPr>
   </p:defaultTextStyle>
   <p:extLst>
+    <p:ext uri="{EFAFB233-063F-42B5-8137-9DF3F51BA10A}">
+      <p15:sldGuideLst xmlns:p15="http://schemas.microsoft.com/office/powerpoint/2012/main"/>
+    </p:ext>
     <p:ext uri="http://customooxmlschemas.google.com/">
-      <go:slidesCustomData xmlns:go="http://customooxmlschemas.google.com/" xmlns:p15="http://schemas.microsoft.com/office/powerpoint/2012/main" xmlns:p14="http://schemas.microsoft.com/office/powerpoint/2010/main" xmlns:com="http://schemas.openxmlformats.org/drawingml/2006/compatibility" xmlns:pvml="urn:schemas-microsoft-com:office:powerpoint" xmlns:v="urn:schemas-microsoft-com:vml" xmlns:o="urn:schemas-microsoft-com:office:office" xmlns:dgm="http://schemas.openxmlformats.org/drawingml/2006/diagram" xmlns:c="http://schemas.openxmlformats.org/drawingml/2006/chart" xmlns:mv="urn:schemas-microsoft-com:mac:vml" xmlns:mc="http://schemas.openxmlformats.org/markup-compatibility/2006" xmlns="" r:id="rId27" roundtripDataSignature="AMtx7miLHh/FYMLv5TL6jHxOQm2wpUjrOQ=="/>
+      <go:slidesCustomData xmlns="" xmlns:mc="http://schemas.openxmlformats.org/markup-compatibility/2006" xmlns:mv="urn:schemas-microsoft-com:mac:vml" xmlns:c="http://schemas.openxmlformats.org/drawingml/2006/chart" xmlns:dgm="http://schemas.openxmlformats.org/drawingml/2006/diagram" xmlns:o="urn:schemas-microsoft-com:office:office" xmlns:v="urn:schemas-microsoft-com:vml" xmlns:pvml="urn:schemas-microsoft-com:office:powerpoint" xmlns:com="http://schemas.openxmlformats.org/drawingml/2006/compatibility" xmlns:p14="http://schemas.microsoft.com/office/powerpoint/2010/main" xmlns:p15="http://schemas.microsoft.com/office/powerpoint/2012/main" xmlns:go="http://customooxmlschemas.google.com/" r:id="rId27" roundtripDataSignature="AMtx7miLHh/FYMLv5TL6jHxOQm2wpUjrOQ=="/>
     </p:ext>
   </p:extLst>
 </p:presentation>
@@ -3247,7 +3250,7 @@
             </a:pPr>
             <a:fld id="{00000000-1234-1234-1234-123412341234}" type="slidenum">
               <a:rPr lang="nl-NL" altLang="nl-NL"/>
-              <a:t>‹nr.›</a:t>
+              <a:t>‹#›</a:t>
             </a:fld>
             <a:endParaRPr/>
           </a:p>
@@ -3947,7 +3950,7 @@
             </a:pPr>
             <a:fld id="{00000000-1234-1234-1234-123412341234}" type="slidenum">
               <a:rPr lang="nl-NL" altLang="nl-NL"/>
-              <a:t>‹nr.›</a:t>
+              <a:t>‹#›</a:t>
             </a:fld>
             <a:endParaRPr/>
           </a:p>
@@ -4647,7 +4650,7 @@
             </a:pPr>
             <a:fld id="{00000000-1234-1234-1234-123412341234}" type="slidenum">
               <a:rPr lang="nl-NL" altLang="nl-NL"/>
-              <a:t>‹nr.›</a:t>
+              <a:t>‹#›</a:t>
             </a:fld>
             <a:endParaRPr/>
           </a:p>
@@ -5347,7 +5350,7 @@
             </a:pPr>
             <a:fld id="{00000000-1234-1234-1234-123412341234}" type="slidenum">
               <a:rPr lang="nl-NL" altLang="nl-NL"/>
-              <a:t>‹nr.›</a:t>
+              <a:t>‹#›</a:t>
             </a:fld>
             <a:endParaRPr/>
           </a:p>
@@ -6088,7 +6091,7 @@
             </a:pPr>
             <a:fld id="{00000000-1234-1234-1234-123412341234}" type="slidenum">
               <a:rPr lang="nl-NL" altLang="nl-NL"/>
-              <a:t>‹nr.›</a:t>
+              <a:t>‹#›</a:t>
             </a:fld>
             <a:endParaRPr/>
           </a:p>
@@ -6948,7 +6951,7 @@
             </a:pPr>
             <a:fld id="{00000000-1234-1234-1234-123412341234}" type="slidenum">
               <a:rPr lang="nl-NL" altLang="nl-NL"/>
-              <a:t>‹nr.›</a:t>
+              <a:t>‹#›</a:t>
             </a:fld>
             <a:endParaRPr/>
           </a:p>
@@ -8136,7 +8139,7 @@
             </a:pPr>
             <a:fld id="{00000000-1234-1234-1234-123412341234}" type="slidenum">
               <a:rPr lang="nl-NL" altLang="nl-NL"/>
-              <a:t>‹nr.›</a:t>
+              <a:t>‹#›</a:t>
             </a:fld>
             <a:endParaRPr/>
           </a:p>
@@ -8676,7 +8679,7 @@
             </a:pPr>
             <a:fld id="{00000000-1234-1234-1234-123412341234}" type="slidenum">
               <a:rPr lang="nl-NL" altLang="nl-NL"/>
-              <a:t>‹nr.›</a:t>
+              <a:t>‹#›</a:t>
             </a:fld>
             <a:endParaRPr/>
           </a:p>
@@ -9077,7 +9080,7 @@
             </a:pPr>
             <a:fld id="{00000000-1234-1234-1234-123412341234}" type="slidenum">
               <a:rPr lang="nl-NL" altLang="nl-NL"/>
-              <a:t>‹nr.›</a:t>
+              <a:t>‹#›</a:t>
             </a:fld>
             <a:endParaRPr/>
           </a:p>
@@ -9942,7 +9945,7 @@
             </a:pPr>
             <a:fld id="{00000000-1234-1234-1234-123412341234}" type="slidenum">
               <a:rPr lang="nl-NL" altLang="nl-NL"/>
-              <a:t>‹nr.›</a:t>
+              <a:t>‹#›</a:t>
             </a:fld>
             <a:endParaRPr/>
           </a:p>
@@ -10917,7 +10920,7 @@
             </a:pPr>
             <a:fld id="{00000000-1234-1234-1234-123412341234}" type="slidenum">
               <a:rPr lang="nl-NL" altLang="nl-NL"/>
-              <a:t>‹nr.›</a:t>
+              <a:t>‹#›</a:t>
             </a:fld>
             <a:endParaRPr/>
           </a:p>
@@ -12040,7 +12043,7 @@
             </a:pPr>
             <a:fld id="{00000000-1234-1234-1234-123412341234}" type="slidenum">
               <a:rPr lang="nl-NL" altLang="nl-NL"/>
-              <a:t>‹nr.›</a:t>
+              <a:t>‹#›</a:t>
             </a:fld>
             <a:endParaRPr/>
           </a:p>
@@ -16891,8 +16894,8 @@
         </p:nvSpPr>
         <p:spPr>
           <a:xfrm>
-            <a:off x="252925" y="353750"/>
-            <a:ext cx="3262800" cy="1784400"/>
+            <a:off x="-7912" y="437479"/>
+            <a:ext cx="3262800" cy="5973898"/>
           </a:xfrm>
           <a:prstGeom prst="rect">
             <a:avLst/>
@@ -16935,8 +16938,8 @@
         </p:nvSpPr>
         <p:spPr>
           <a:xfrm>
-            <a:off x="391225" y="353742"/>
-            <a:ext cx="2947500" cy="1707600"/>
+            <a:off x="307388" y="637206"/>
+            <a:ext cx="2947500" cy="5452698"/>
           </a:xfrm>
           <a:prstGeom prst="rect">
             <a:avLst/>
@@ -16947,38 +16950,345 @@
           </a:ln>
         </p:spPr>
         <p:txBody>
-          <a:bodyPr spcFirstLastPara="1" wrap="square" lIns="91425" tIns="45700" rIns="91425" bIns="45700" numCol="1" anchor="b" anchorCtr="0">
+          <a:bodyPr spcFirstLastPara="1" wrap="square" lIns="91425" tIns="45700" rIns="91425" bIns="45700" numCol="1" anchor="t" anchorCtr="0">
             <a:normAutofit/>
           </a:bodyPr>
           <a:lstStyle/>
           <a:p>
-            <a:pPr marL="0" lvl="0" indent="0" algn="l" rtl="0">
-              <a:lnSpc>
-                <a:spcPct val="90000"/>
-              </a:lnSpc>
-              <a:spcBef>
-                <a:spcPts val="0"/>
-              </a:spcBef>
-              <a:spcAft>
-                <a:spcPts val="0"/>
-              </a:spcAft>
-              <a:buClr>
-                <a:srgbClr val="FFFFFF"/>
-              </a:buClr>
+            <a:pPr lvl="0">
               <a:buSzPts val="2400"/>
-              <a:buFont typeface="Corbel"/>
-              <a:buNone/>
             </a:pPr>
             <a:r>
-              <a:rPr lang="nl-NL" altLang="nl-NL" sz="2400">
+              <a:rPr lang="nl-NL" altLang="nl-NL" sz="2400" dirty="0">
                 <a:latin typeface="Calibri"/>
                 <a:ea typeface="Calibri"/>
                 <a:cs typeface="Calibri"/>
                 <a:sym typeface="Calibri"/>
               </a:rPr>
-              <a:t>2) Correlation between variables (Averaged over Stations, Models)</a:t>
-            </a:r>
-            <a:endParaRPr>
+              <a:t>2) </a:t>
+            </a:r>
+            <a:r>
+              <a:rPr lang="nl-NL" altLang="nl-NL" sz="2400" dirty="0" err="1">
+                <a:latin typeface="Calibri"/>
+                <a:ea typeface="Calibri"/>
+                <a:cs typeface="Calibri"/>
+                <a:sym typeface="Calibri"/>
+              </a:rPr>
+              <a:t>Correlation</a:t>
+            </a:r>
+            <a:r>
+              <a:rPr lang="nl-NL" altLang="nl-NL" sz="2400" dirty="0">
+                <a:latin typeface="Calibri"/>
+                <a:ea typeface="Calibri"/>
+                <a:cs typeface="Calibri"/>
+                <a:sym typeface="Calibri"/>
+              </a:rPr>
+              <a:t> </a:t>
+            </a:r>
+            <a:r>
+              <a:rPr lang="nl-NL" altLang="nl-NL" sz="2400" dirty="0" err="1">
+                <a:latin typeface="Calibri"/>
+                <a:ea typeface="Calibri"/>
+                <a:cs typeface="Calibri"/>
+                <a:sym typeface="Calibri"/>
+              </a:rPr>
+              <a:t>between</a:t>
+            </a:r>
+            <a:r>
+              <a:rPr lang="nl-NL" altLang="nl-NL" sz="2400" dirty="0">
+                <a:latin typeface="Calibri"/>
+                <a:ea typeface="Calibri"/>
+                <a:cs typeface="Calibri"/>
+                <a:sym typeface="Calibri"/>
+              </a:rPr>
+              <a:t> variables (</a:t>
+            </a:r>
+            <a:r>
+              <a:rPr lang="nl-NL" altLang="nl-NL" sz="2400" dirty="0" err="1">
+                <a:latin typeface="Calibri"/>
+                <a:ea typeface="Calibri"/>
+                <a:cs typeface="Calibri"/>
+                <a:sym typeface="Calibri"/>
+              </a:rPr>
+              <a:t>Averaged</a:t>
+            </a:r>
+            <a:r>
+              <a:rPr lang="nl-NL" altLang="nl-NL" sz="2400" dirty="0">
+                <a:latin typeface="Calibri"/>
+                <a:ea typeface="Calibri"/>
+                <a:cs typeface="Calibri"/>
+                <a:sym typeface="Calibri"/>
+              </a:rPr>
+              <a:t> over Stations, </a:t>
+            </a:r>
+            <a:r>
+              <a:rPr lang="nl-NL" altLang="nl-NL" sz="2400" dirty="0" err="1">
+                <a:latin typeface="Calibri"/>
+                <a:ea typeface="Calibri"/>
+                <a:cs typeface="Calibri"/>
+                <a:sym typeface="Calibri"/>
+              </a:rPr>
+              <a:t>Models</a:t>
+            </a:r>
+            <a:r>
+              <a:rPr lang="nl-NL" altLang="nl-NL" sz="2400" dirty="0" smtClean="0">
+                <a:latin typeface="Calibri"/>
+                <a:ea typeface="Calibri"/>
+                <a:cs typeface="Calibri"/>
+                <a:sym typeface="Calibri"/>
+              </a:rPr>
+              <a:t>)</a:t>
+            </a:r>
+            <a:br>
+              <a:rPr lang="nl-NL" altLang="nl-NL" sz="2400" dirty="0" smtClean="0">
+                <a:latin typeface="Calibri"/>
+                <a:ea typeface="Calibri"/>
+                <a:cs typeface="Calibri"/>
+                <a:sym typeface="Calibri"/>
+              </a:rPr>
+            </a:br>
+            <a:r>
+              <a:rPr lang="nl-NL" altLang="nl-NL" sz="2400" dirty="0">
+                <a:latin typeface="Calibri"/>
+                <a:ea typeface="Calibri"/>
+                <a:cs typeface="Calibri"/>
+                <a:sym typeface="Calibri"/>
+              </a:rPr>
+              <a:t/>
+            </a:r>
+            <a:br>
+              <a:rPr lang="nl-NL" altLang="nl-NL" sz="2400" dirty="0">
+                <a:latin typeface="Calibri"/>
+                <a:ea typeface="Calibri"/>
+                <a:cs typeface="Calibri"/>
+                <a:sym typeface="Calibri"/>
+              </a:rPr>
+            </a:br>
+            <a:r>
+              <a:rPr lang="nl-NL" altLang="nl-NL" sz="1800" dirty="0" err="1" smtClean="0">
+                <a:latin typeface="Calibri"/>
+                <a:ea typeface="Calibri"/>
+                <a:cs typeface="Calibri"/>
+                <a:sym typeface="Calibri"/>
+              </a:rPr>
+              <a:t>helps</a:t>
+            </a:r>
+            <a:r>
+              <a:rPr lang="nl-NL" altLang="nl-NL" sz="1800" dirty="0" smtClean="0">
+                <a:latin typeface="Calibri"/>
+                <a:ea typeface="Calibri"/>
+                <a:cs typeface="Calibri"/>
+                <a:sym typeface="Calibri"/>
+              </a:rPr>
+              <a:t> in first </a:t>
+            </a:r>
+            <a:r>
+              <a:rPr lang="nl-NL" altLang="nl-NL" sz="1800" dirty="0" err="1" smtClean="0">
+                <a:latin typeface="Calibri"/>
+                <a:ea typeface="Calibri"/>
+                <a:cs typeface="Calibri"/>
+                <a:sym typeface="Calibri"/>
+              </a:rPr>
+              <a:t>interpretation</a:t>
+            </a:r>
+            <a:r>
+              <a:rPr lang="nl-NL" altLang="nl-NL" sz="1800" dirty="0" smtClean="0">
+                <a:latin typeface="Calibri"/>
+                <a:ea typeface="Calibri"/>
+                <a:cs typeface="Calibri"/>
+                <a:sym typeface="Calibri"/>
+              </a:rPr>
+              <a:t> of variables:</a:t>
+            </a:r>
+            <a:br>
+              <a:rPr lang="nl-NL" altLang="nl-NL" sz="1800" dirty="0" smtClean="0">
+                <a:latin typeface="Calibri"/>
+                <a:ea typeface="Calibri"/>
+                <a:cs typeface="Calibri"/>
+                <a:sym typeface="Calibri"/>
+              </a:rPr>
+            </a:br>
+            <a:r>
+              <a:rPr lang="nl-NL" altLang="nl-NL" sz="1800" dirty="0" err="1" smtClean="0">
+                <a:latin typeface="Calibri"/>
+                <a:ea typeface="Calibri"/>
+                <a:cs typeface="Calibri"/>
+                <a:sym typeface="Calibri"/>
+              </a:rPr>
+              <a:t>for</a:t>
+            </a:r>
+            <a:r>
+              <a:rPr lang="nl-NL" altLang="nl-NL" sz="1800" dirty="0" smtClean="0">
+                <a:latin typeface="Calibri"/>
+                <a:ea typeface="Calibri"/>
+                <a:cs typeface="Calibri"/>
+                <a:sym typeface="Calibri"/>
+              </a:rPr>
+              <a:t> </a:t>
+            </a:r>
+            <a:r>
+              <a:rPr lang="nl-NL" altLang="nl-NL" sz="1800" dirty="0" err="1" smtClean="0">
+                <a:latin typeface="Calibri"/>
+                <a:ea typeface="Calibri"/>
+                <a:cs typeface="Calibri"/>
+                <a:sym typeface="Calibri"/>
+              </a:rPr>
+              <a:t>example</a:t>
+            </a:r>
+            <a:r>
+              <a:rPr lang="nl-NL" altLang="nl-NL" sz="1800" dirty="0" smtClean="0">
+                <a:latin typeface="Calibri"/>
+                <a:ea typeface="Calibri"/>
+                <a:cs typeface="Calibri"/>
+                <a:sym typeface="Calibri"/>
+              </a:rPr>
+              <a:t>, short </a:t>
+            </a:r>
+            <a:r>
+              <a:rPr lang="nl-NL" altLang="nl-NL" sz="1800" dirty="0">
+                <a:latin typeface="Calibri"/>
+                <a:ea typeface="Calibri"/>
+                <a:cs typeface="Calibri"/>
+                <a:sym typeface="Calibri"/>
+              </a:rPr>
+              <a:t>wave </a:t>
+            </a:r>
+            <a:r>
+              <a:rPr lang="nl-NL" altLang="nl-NL" sz="1800" dirty="0" err="1">
+                <a:latin typeface="Calibri"/>
+                <a:ea typeface="Calibri"/>
+                <a:cs typeface="Calibri"/>
+                <a:sym typeface="Calibri"/>
+              </a:rPr>
+              <a:t>radiation</a:t>
+            </a:r>
+            <a:r>
+              <a:rPr lang="nl-NL" altLang="nl-NL" sz="1800" dirty="0">
+                <a:latin typeface="Calibri"/>
+                <a:ea typeface="Calibri"/>
+                <a:cs typeface="Calibri"/>
+                <a:sym typeface="Calibri"/>
+              </a:rPr>
+              <a:t> (</a:t>
+            </a:r>
+            <a:r>
+              <a:rPr lang="nl-NL" altLang="nl-NL" sz="1800" dirty="0" err="1">
+                <a:latin typeface="Calibri"/>
+                <a:ea typeface="Calibri"/>
+                <a:cs typeface="Calibri"/>
+                <a:sym typeface="Calibri"/>
+              </a:rPr>
+              <a:t>sunlight</a:t>
+            </a:r>
+            <a:r>
+              <a:rPr lang="nl-NL" altLang="nl-NL" sz="1800" dirty="0">
+                <a:latin typeface="Calibri"/>
+                <a:ea typeface="Calibri"/>
+                <a:cs typeface="Calibri"/>
+                <a:sym typeface="Calibri"/>
+              </a:rPr>
+              <a:t>) </a:t>
+            </a:r>
+            <a:r>
+              <a:rPr lang="nl-NL" altLang="nl-NL" sz="1800" dirty="0" err="1">
+                <a:latin typeface="Calibri"/>
+                <a:ea typeface="Calibri"/>
+                <a:cs typeface="Calibri"/>
+                <a:sym typeface="Calibri"/>
+              </a:rPr>
+              <a:t>and</a:t>
+            </a:r>
+            <a:r>
+              <a:rPr lang="nl-NL" altLang="nl-NL" sz="1800" dirty="0">
+                <a:latin typeface="Calibri"/>
+                <a:ea typeface="Calibri"/>
+                <a:cs typeface="Calibri"/>
+                <a:sym typeface="Calibri"/>
+              </a:rPr>
+              <a:t> </a:t>
+            </a:r>
+            <a:r>
+              <a:rPr lang="nl-NL" altLang="nl-NL" sz="1800" dirty="0" err="1">
+                <a:latin typeface="Calibri"/>
+                <a:ea typeface="Calibri"/>
+                <a:cs typeface="Calibri"/>
+                <a:sym typeface="Calibri"/>
+              </a:rPr>
+              <a:t>cloud</a:t>
+            </a:r>
+            <a:r>
+              <a:rPr lang="nl-NL" altLang="nl-NL" sz="1800" dirty="0">
+                <a:latin typeface="Calibri"/>
+                <a:ea typeface="Calibri"/>
+                <a:cs typeface="Calibri"/>
+                <a:sym typeface="Calibri"/>
+              </a:rPr>
+              <a:t> cover </a:t>
+            </a:r>
+            <a:r>
+              <a:rPr lang="nl-NL" altLang="nl-NL" sz="1800" dirty="0" err="1">
+                <a:latin typeface="Calibri"/>
+                <a:ea typeface="Calibri"/>
+                <a:cs typeface="Calibri"/>
+                <a:sym typeface="Calibri"/>
+              </a:rPr>
+              <a:t>always</a:t>
+            </a:r>
+            <a:r>
+              <a:rPr lang="nl-NL" altLang="nl-NL" sz="1800" dirty="0">
+                <a:latin typeface="Calibri"/>
+                <a:ea typeface="Calibri"/>
+                <a:cs typeface="Calibri"/>
+                <a:sym typeface="Calibri"/>
+              </a:rPr>
+              <a:t> </a:t>
+            </a:r>
+            <a:r>
+              <a:rPr lang="nl-NL" altLang="nl-NL" sz="1800" dirty="0" err="1">
+                <a:latin typeface="Calibri"/>
+                <a:ea typeface="Calibri"/>
+                <a:cs typeface="Calibri"/>
+                <a:sym typeface="Calibri"/>
+              </a:rPr>
+              <a:t>very</a:t>
+            </a:r>
+            <a:r>
+              <a:rPr lang="nl-NL" altLang="nl-NL" sz="1800" dirty="0">
+                <a:latin typeface="Calibri"/>
+                <a:ea typeface="Calibri"/>
+                <a:cs typeface="Calibri"/>
+                <a:sym typeface="Calibri"/>
+              </a:rPr>
+              <a:t> </a:t>
+            </a:r>
+            <a:r>
+              <a:rPr lang="nl-NL" altLang="nl-NL" sz="1800" dirty="0" err="1">
+                <a:latin typeface="Calibri"/>
+                <a:ea typeface="Calibri"/>
+                <a:cs typeface="Calibri"/>
+                <a:sym typeface="Calibri"/>
+              </a:rPr>
+              <a:t>negatively</a:t>
+            </a:r>
+            <a:r>
+              <a:rPr lang="nl-NL" altLang="nl-NL" sz="1800" dirty="0">
+                <a:latin typeface="Calibri"/>
+                <a:ea typeface="Calibri"/>
+                <a:cs typeface="Calibri"/>
+                <a:sym typeface="Calibri"/>
+              </a:rPr>
+              <a:t> </a:t>
+            </a:r>
+            <a:r>
+              <a:rPr lang="nl-NL" altLang="nl-NL" sz="1800" dirty="0" err="1">
+                <a:latin typeface="Calibri"/>
+                <a:ea typeface="Calibri"/>
+                <a:cs typeface="Calibri"/>
+                <a:sym typeface="Calibri"/>
+              </a:rPr>
+              <a:t>correlated</a:t>
+            </a:r>
+            <a:endParaRPr sz="1800" dirty="0">
               <a:latin typeface="Calibri"/>
               <a:ea typeface="Calibri"/>
               <a:cs typeface="Calibri"/>
@@ -17035,18 +17345,17 @@
           <p:cNvPicPr preferRelativeResize="0"/>
           <p:nvPr/>
         </p:nvPicPr>
-        <p:blipFill>
+        <p:blipFill rotWithShape="1">
           <a:blip r:embed="rId3">
             <a:alphaModFix/>
           </a:blip>
-          <a:stretch>
-            <a:fillRect/>
-          </a:stretch>
+          <a:srcRect l="9755" r="10990"/>
+          <a:stretch/>
         </p:blipFill>
         <p:spPr>
           <a:xfrm>
-            <a:off x="931875" y="2184000"/>
-            <a:ext cx="10499224" cy="3674724"/>
+            <a:off x="3729950" y="2061342"/>
+            <a:ext cx="7908914" cy="3461634"/>
           </a:xfrm>
           <a:prstGeom prst="rect">
             <a:avLst/>
@@ -17146,8 +17455,8 @@
         </p:nvSpPr>
         <p:spPr>
           <a:xfrm>
-            <a:off x="0" y="0"/>
-            <a:ext cx="2881200" cy="1155900"/>
+            <a:off x="0" y="-1"/>
+            <a:ext cx="2881200" cy="6857999"/>
           </a:xfrm>
           <a:prstGeom prst="rect">
             <a:avLst/>
@@ -17191,7 +17500,7 @@
         <p:spPr>
           <a:xfrm>
             <a:off x="56675" y="163750"/>
-            <a:ext cx="2824500" cy="879300"/>
+            <a:ext cx="2824500" cy="5039186"/>
           </a:xfrm>
           <a:prstGeom prst="rect">
             <a:avLst/>
@@ -17225,15 +17534,802 @@
               <a:buNone/>
             </a:pPr>
             <a:r>
-              <a:rPr lang="nl-NL" altLang="nl-NL" sz="2400">
+              <a:rPr lang="nl-NL" altLang="nl-NL" sz="2400" dirty="0">
                 <a:latin typeface="Calibri"/>
                 <a:ea typeface="Calibri"/>
                 <a:cs typeface="Calibri"/>
                 <a:sym typeface="Calibri"/>
               </a:rPr>
-              <a:t>2) Correlation between variables per season </a:t>
-            </a:r>
-            <a:endParaRPr>
+              <a:t>2) </a:t>
+            </a:r>
+            <a:r>
+              <a:rPr lang="nl-NL" altLang="nl-NL" sz="2400" dirty="0" err="1">
+                <a:latin typeface="Calibri"/>
+                <a:ea typeface="Calibri"/>
+                <a:cs typeface="Calibri"/>
+                <a:sym typeface="Calibri"/>
+              </a:rPr>
+              <a:t>Correlation</a:t>
+            </a:r>
+            <a:r>
+              <a:rPr lang="nl-NL" altLang="nl-NL" sz="2400" dirty="0">
+                <a:latin typeface="Calibri"/>
+                <a:ea typeface="Calibri"/>
+                <a:cs typeface="Calibri"/>
+                <a:sym typeface="Calibri"/>
+              </a:rPr>
+              <a:t> </a:t>
+            </a:r>
+            <a:r>
+              <a:rPr lang="nl-NL" altLang="nl-NL" sz="2400" dirty="0" err="1">
+                <a:latin typeface="Calibri"/>
+                <a:ea typeface="Calibri"/>
+                <a:cs typeface="Calibri"/>
+                <a:sym typeface="Calibri"/>
+              </a:rPr>
+              <a:t>between</a:t>
+            </a:r>
+            <a:r>
+              <a:rPr lang="nl-NL" altLang="nl-NL" sz="2400" dirty="0">
+                <a:latin typeface="Calibri"/>
+                <a:ea typeface="Calibri"/>
+                <a:cs typeface="Calibri"/>
+                <a:sym typeface="Calibri"/>
+              </a:rPr>
+              <a:t> variables per </a:t>
+            </a:r>
+            <a:r>
+              <a:rPr lang="nl-NL" altLang="nl-NL" sz="2400" dirty="0" err="1">
+                <a:latin typeface="Calibri"/>
+                <a:ea typeface="Calibri"/>
+                <a:cs typeface="Calibri"/>
+                <a:sym typeface="Calibri"/>
+              </a:rPr>
+              <a:t>season</a:t>
+            </a:r>
+            <a:r>
+              <a:rPr lang="nl-NL" altLang="nl-NL" sz="2400" dirty="0">
+                <a:latin typeface="Calibri"/>
+                <a:ea typeface="Calibri"/>
+                <a:cs typeface="Calibri"/>
+                <a:sym typeface="Calibri"/>
+              </a:rPr>
+              <a:t> </a:t>
+            </a:r>
+            <a:r>
+              <a:rPr lang="nl-NL" altLang="nl-NL" sz="2400" dirty="0" smtClean="0">
+                <a:latin typeface="Calibri"/>
+                <a:ea typeface="Calibri"/>
+                <a:cs typeface="Calibri"/>
+                <a:sym typeface="Calibri"/>
+              </a:rPr>
+              <a:t/>
+            </a:r>
+            <a:br>
+              <a:rPr lang="nl-NL" altLang="nl-NL" sz="2400" dirty="0" smtClean="0">
+                <a:latin typeface="Calibri"/>
+                <a:ea typeface="Calibri"/>
+                <a:cs typeface="Calibri"/>
+                <a:sym typeface="Calibri"/>
+              </a:rPr>
+            </a:br>
+            <a:r>
+              <a:rPr lang="nl-NL" altLang="nl-NL" sz="2400" dirty="0">
+                <a:latin typeface="Calibri"/>
+                <a:ea typeface="Calibri"/>
+                <a:cs typeface="Calibri"/>
+                <a:sym typeface="Calibri"/>
+              </a:rPr>
+              <a:t/>
+            </a:r>
+            <a:br>
+              <a:rPr lang="nl-NL" altLang="nl-NL" sz="2400" dirty="0">
+                <a:latin typeface="Calibri"/>
+                <a:ea typeface="Calibri"/>
+                <a:cs typeface="Calibri"/>
+                <a:sym typeface="Calibri"/>
+              </a:rPr>
+            </a:br>
+            <a:r>
+              <a:rPr lang="nl-NL" altLang="nl-NL" sz="1600" dirty="0" smtClean="0">
+                <a:latin typeface="Calibri"/>
+                <a:ea typeface="Calibri"/>
+                <a:cs typeface="Calibri"/>
+                <a:sym typeface="Calibri"/>
+              </a:rPr>
+              <a:t>First </a:t>
+            </a:r>
+            <a:r>
+              <a:rPr lang="nl-NL" altLang="nl-NL" sz="1600" dirty="0" err="1" smtClean="0">
+                <a:latin typeface="Calibri"/>
+                <a:ea typeface="Calibri"/>
+                <a:cs typeface="Calibri"/>
+                <a:sym typeface="Calibri"/>
+              </a:rPr>
+              <a:t>observations</a:t>
+            </a:r>
+            <a:r>
+              <a:rPr lang="nl-NL" altLang="nl-NL" sz="1600" dirty="0" smtClean="0">
+                <a:latin typeface="Calibri"/>
+                <a:ea typeface="Calibri"/>
+                <a:cs typeface="Calibri"/>
+                <a:sym typeface="Calibri"/>
+              </a:rPr>
+              <a:t>: does indeed show </a:t>
+            </a:r>
+            <a:r>
+              <a:rPr lang="nl-NL" altLang="nl-NL" sz="1600" dirty="0" err="1" smtClean="0">
+                <a:latin typeface="Calibri"/>
+                <a:ea typeface="Calibri"/>
+                <a:cs typeface="Calibri"/>
+                <a:sym typeface="Calibri"/>
+              </a:rPr>
+              <a:t>differences</a:t>
+            </a:r>
+            <a:r>
+              <a:rPr lang="nl-NL" altLang="nl-NL" sz="1600" dirty="0" smtClean="0">
+                <a:latin typeface="Calibri"/>
+                <a:ea typeface="Calibri"/>
+                <a:cs typeface="Calibri"/>
+                <a:sym typeface="Calibri"/>
+              </a:rPr>
+              <a:t> </a:t>
+            </a:r>
+            <a:r>
+              <a:rPr lang="nl-NL" altLang="nl-NL" sz="1600" dirty="0" err="1" smtClean="0">
+                <a:latin typeface="Calibri"/>
+                <a:ea typeface="Calibri"/>
+                <a:cs typeface="Calibri"/>
+                <a:sym typeface="Calibri"/>
+              </a:rPr>
+              <a:t>between</a:t>
+            </a:r>
+            <a:r>
+              <a:rPr lang="nl-NL" altLang="nl-NL" sz="1600" dirty="0" smtClean="0">
+                <a:latin typeface="Calibri"/>
+                <a:ea typeface="Calibri"/>
+                <a:cs typeface="Calibri"/>
+                <a:sym typeface="Calibri"/>
+              </a:rPr>
+              <a:t> </a:t>
+            </a:r>
+            <a:r>
+              <a:rPr lang="nl-NL" altLang="nl-NL" sz="1600" dirty="0" err="1" smtClean="0">
+                <a:latin typeface="Calibri"/>
+                <a:ea typeface="Calibri"/>
+                <a:cs typeface="Calibri"/>
+                <a:sym typeface="Calibri"/>
+              </a:rPr>
+              <a:t>seasons</a:t>
+            </a:r>
+            <a:r>
+              <a:rPr lang="nl-NL" altLang="nl-NL" sz="1600" dirty="0" smtClean="0">
+                <a:latin typeface="Calibri"/>
+                <a:ea typeface="Calibri"/>
+                <a:cs typeface="Calibri"/>
+                <a:sym typeface="Calibri"/>
+              </a:rPr>
+              <a:t>. </a:t>
+            </a:r>
+            <a:r>
+              <a:rPr lang="nl-NL" altLang="nl-NL" sz="1600" dirty="0" err="1" smtClean="0">
+                <a:latin typeface="Calibri"/>
+                <a:ea typeface="Calibri"/>
+                <a:cs typeface="Calibri"/>
+                <a:sym typeface="Calibri"/>
+              </a:rPr>
+              <a:t>Correlations</a:t>
+            </a:r>
+            <a:r>
+              <a:rPr lang="nl-NL" altLang="nl-NL" sz="1600" dirty="0" smtClean="0">
+                <a:latin typeface="Calibri"/>
+                <a:ea typeface="Calibri"/>
+                <a:cs typeface="Calibri"/>
+                <a:sym typeface="Calibri"/>
+              </a:rPr>
+              <a:t> </a:t>
+            </a:r>
+            <a:r>
+              <a:rPr lang="nl-NL" altLang="nl-NL" sz="1600" dirty="0" err="1" smtClean="0">
+                <a:latin typeface="Calibri"/>
+                <a:ea typeface="Calibri"/>
+                <a:cs typeface="Calibri"/>
+                <a:sym typeface="Calibri"/>
+              </a:rPr>
+              <a:t>which</a:t>
+            </a:r>
+            <a:r>
+              <a:rPr lang="nl-NL" altLang="nl-NL" sz="1600" dirty="0" smtClean="0">
+                <a:latin typeface="Calibri"/>
+                <a:ea typeface="Calibri"/>
+                <a:cs typeface="Calibri"/>
+                <a:sym typeface="Calibri"/>
+              </a:rPr>
+              <a:t> change most over the </a:t>
+            </a:r>
+            <a:r>
+              <a:rPr lang="nl-NL" altLang="nl-NL" sz="1600" dirty="0" err="1" smtClean="0">
+                <a:latin typeface="Calibri"/>
+                <a:ea typeface="Calibri"/>
+                <a:cs typeface="Calibri"/>
+                <a:sym typeface="Calibri"/>
+              </a:rPr>
+              <a:t>seasons</a:t>
+            </a:r>
+            <a:r>
+              <a:rPr lang="nl-NL" altLang="nl-NL" sz="1600" dirty="0" smtClean="0">
+                <a:latin typeface="Calibri"/>
+                <a:ea typeface="Calibri"/>
+                <a:cs typeface="Calibri"/>
+                <a:sym typeface="Calibri"/>
+              </a:rPr>
+              <a:t>:</a:t>
+            </a:r>
+            <a:br>
+              <a:rPr lang="nl-NL" altLang="nl-NL" sz="1600" dirty="0" smtClean="0">
+                <a:latin typeface="Calibri"/>
+                <a:ea typeface="Calibri"/>
+                <a:cs typeface="Calibri"/>
+                <a:sym typeface="Calibri"/>
+              </a:rPr>
+            </a:br>
+            <a:r>
+              <a:rPr lang="nl-NL" altLang="nl-NL" sz="1600" dirty="0" smtClean="0">
+                <a:latin typeface="Calibri"/>
+                <a:ea typeface="Calibri"/>
+                <a:cs typeface="Calibri"/>
+                <a:sym typeface="Calibri"/>
+              </a:rPr>
+              <a:t>- short wave </a:t>
+            </a:r>
+            <a:r>
+              <a:rPr lang="nl-NL" altLang="nl-NL" sz="1600" dirty="0" err="1" smtClean="0">
+                <a:latin typeface="Calibri"/>
+                <a:ea typeface="Calibri"/>
+                <a:cs typeface="Calibri"/>
+                <a:sym typeface="Calibri"/>
+              </a:rPr>
+              <a:t>radiation</a:t>
+            </a:r>
+            <a:r>
+              <a:rPr lang="nl-NL" altLang="nl-NL" sz="1600" dirty="0" smtClean="0">
+                <a:latin typeface="Calibri"/>
+                <a:ea typeface="Calibri"/>
+                <a:cs typeface="Calibri"/>
+                <a:sym typeface="Calibri"/>
+              </a:rPr>
+              <a:t> </a:t>
+            </a:r>
+            <a:r>
+              <a:rPr lang="nl-NL" altLang="nl-NL" sz="1600" dirty="0" err="1" smtClean="0">
+                <a:latin typeface="Calibri"/>
+                <a:ea typeface="Calibri"/>
+                <a:cs typeface="Calibri"/>
+                <a:sym typeface="Calibri"/>
+              </a:rPr>
+              <a:t>and</a:t>
+            </a:r>
+            <a:r>
+              <a:rPr lang="nl-NL" altLang="nl-NL" sz="1600" dirty="0" smtClean="0">
+                <a:latin typeface="Calibri"/>
+                <a:ea typeface="Calibri"/>
+                <a:cs typeface="Calibri"/>
+                <a:sym typeface="Calibri"/>
+              </a:rPr>
+              <a:t> </a:t>
+            </a:r>
+            <a:r>
+              <a:rPr lang="nl-NL" altLang="nl-NL" sz="1600" dirty="0" err="1" smtClean="0">
+                <a:latin typeface="Calibri"/>
+                <a:ea typeface="Calibri"/>
+                <a:cs typeface="Calibri"/>
+                <a:sym typeface="Calibri"/>
+              </a:rPr>
+              <a:t>temperature</a:t>
+            </a:r>
+            <a:r>
+              <a:rPr lang="nl-NL" altLang="nl-NL" sz="1600" dirty="0" smtClean="0">
+                <a:latin typeface="Calibri"/>
+                <a:ea typeface="Calibri"/>
+                <a:cs typeface="Calibri"/>
+                <a:sym typeface="Calibri"/>
+              </a:rPr>
+              <a:t> </a:t>
+            </a:r>
+            <a:r>
+              <a:rPr lang="nl-NL" altLang="nl-NL" sz="1600" dirty="0" err="1" smtClean="0">
+                <a:latin typeface="Calibri"/>
+                <a:ea typeface="Calibri"/>
+                <a:cs typeface="Calibri"/>
+                <a:sym typeface="Calibri"/>
+              </a:rPr>
+              <a:t>above</a:t>
+            </a:r>
+            <a:r>
+              <a:rPr lang="nl-NL" altLang="nl-NL" sz="1600" dirty="0" smtClean="0">
+                <a:latin typeface="Calibri"/>
+                <a:ea typeface="Calibri"/>
+                <a:cs typeface="Calibri"/>
+                <a:sym typeface="Calibri"/>
+              </a:rPr>
+              <a:t> </a:t>
+            </a:r>
+            <a:r>
+              <a:rPr lang="nl-NL" altLang="nl-NL" sz="1600" dirty="0" err="1" smtClean="0">
+                <a:latin typeface="Calibri"/>
+                <a:ea typeface="Calibri"/>
+                <a:cs typeface="Calibri"/>
+                <a:sym typeface="Calibri"/>
+              </a:rPr>
+              <a:t>surface</a:t>
+            </a:r>
+            <a:r>
+              <a:rPr lang="nl-NL" altLang="nl-NL" sz="1600" dirty="0" smtClean="0">
+                <a:latin typeface="Calibri"/>
+                <a:ea typeface="Calibri"/>
+                <a:cs typeface="Calibri"/>
+                <a:sym typeface="Calibri"/>
+              </a:rPr>
+              <a:t> (</a:t>
+            </a:r>
+            <a:r>
+              <a:rPr lang="nl-NL" altLang="nl-NL" sz="1600" dirty="0" err="1" smtClean="0">
+                <a:latin typeface="Calibri"/>
+                <a:ea typeface="Calibri"/>
+                <a:cs typeface="Calibri"/>
+                <a:sym typeface="Calibri"/>
+              </a:rPr>
+              <a:t>why</a:t>
+            </a:r>
+            <a:r>
+              <a:rPr lang="nl-NL" altLang="nl-NL" sz="1600" dirty="0" smtClean="0">
+                <a:latin typeface="Calibri"/>
+                <a:ea typeface="Calibri"/>
+                <a:cs typeface="Calibri"/>
+                <a:sym typeface="Calibri"/>
+              </a:rPr>
+              <a:t>?)</a:t>
+            </a:r>
+            <a:br>
+              <a:rPr lang="nl-NL" altLang="nl-NL" sz="1600" dirty="0" smtClean="0">
+                <a:latin typeface="Calibri"/>
+                <a:ea typeface="Calibri"/>
+                <a:cs typeface="Calibri"/>
+                <a:sym typeface="Calibri"/>
+              </a:rPr>
+            </a:br>
+            <a:r>
+              <a:rPr lang="nl-NL" altLang="nl-NL" sz="1600" dirty="0" smtClean="0">
+                <a:latin typeface="Calibri"/>
+                <a:ea typeface="Calibri"/>
+                <a:cs typeface="Calibri"/>
+                <a:sym typeface="Calibri"/>
+              </a:rPr>
+              <a:t>- </a:t>
+            </a:r>
+            <a:r>
+              <a:rPr lang="nl-NL" altLang="nl-NL" sz="1600" dirty="0" err="1" smtClean="0">
+                <a:latin typeface="Calibri"/>
+                <a:ea typeface="Calibri"/>
+                <a:cs typeface="Calibri"/>
+                <a:sym typeface="Calibri"/>
+              </a:rPr>
+              <a:t>east</a:t>
+            </a:r>
+            <a:r>
+              <a:rPr lang="nl-NL" altLang="nl-NL" sz="1600" dirty="0" smtClean="0">
+                <a:latin typeface="Calibri"/>
+                <a:ea typeface="Calibri"/>
+                <a:cs typeface="Calibri"/>
+                <a:sym typeface="Calibri"/>
+              </a:rPr>
+              <a:t> wind </a:t>
+            </a:r>
+            <a:r>
+              <a:rPr lang="nl-NL" altLang="nl-NL" sz="1600" dirty="0" err="1" smtClean="0">
+                <a:latin typeface="Calibri"/>
+                <a:ea typeface="Calibri"/>
+                <a:cs typeface="Calibri"/>
+                <a:sym typeface="Calibri"/>
+              </a:rPr>
+              <a:t>and</a:t>
+            </a:r>
+            <a:r>
+              <a:rPr lang="nl-NL" altLang="nl-NL" sz="1600" dirty="0" smtClean="0">
+                <a:latin typeface="Calibri"/>
+                <a:ea typeface="Calibri"/>
+                <a:cs typeface="Calibri"/>
+                <a:sym typeface="Calibri"/>
+              </a:rPr>
+              <a:t> </a:t>
+            </a:r>
+            <a:r>
+              <a:rPr lang="nl-NL" altLang="nl-NL" sz="1600" dirty="0" err="1" smtClean="0">
+                <a:latin typeface="Calibri"/>
+                <a:ea typeface="Calibri"/>
+                <a:cs typeface="Calibri"/>
+                <a:sym typeface="Calibri"/>
+              </a:rPr>
+              <a:t>temperature</a:t>
+            </a:r>
+            <a:r>
+              <a:rPr lang="nl-NL" altLang="nl-NL" sz="1600" dirty="0" smtClean="0">
+                <a:latin typeface="Calibri"/>
+                <a:ea typeface="Calibri"/>
+                <a:cs typeface="Calibri"/>
+                <a:sym typeface="Calibri"/>
+              </a:rPr>
+              <a:t> </a:t>
+            </a:r>
+            <a:r>
+              <a:rPr lang="nl-NL" altLang="nl-NL" sz="1600" dirty="0" err="1" smtClean="0">
+                <a:latin typeface="Calibri"/>
+                <a:ea typeface="Calibri"/>
+                <a:cs typeface="Calibri"/>
+                <a:sym typeface="Calibri"/>
+              </a:rPr>
+              <a:t>above</a:t>
+            </a:r>
+            <a:r>
+              <a:rPr lang="nl-NL" altLang="nl-NL" sz="1600" dirty="0" smtClean="0">
+                <a:latin typeface="Calibri"/>
+                <a:ea typeface="Calibri"/>
+                <a:cs typeface="Calibri"/>
+                <a:sym typeface="Calibri"/>
+              </a:rPr>
+              <a:t> </a:t>
+            </a:r>
+            <a:r>
+              <a:rPr lang="nl-NL" altLang="nl-NL" sz="1600" dirty="0" err="1" smtClean="0">
+                <a:latin typeface="Calibri"/>
+                <a:ea typeface="Calibri"/>
+                <a:cs typeface="Calibri"/>
+                <a:sym typeface="Calibri"/>
+              </a:rPr>
+              <a:t>surface</a:t>
+            </a:r>
+            <a:r>
+              <a:rPr lang="nl-NL" altLang="nl-NL" sz="1600" dirty="0">
+                <a:latin typeface="Calibri"/>
+                <a:ea typeface="Calibri"/>
+                <a:cs typeface="Calibri"/>
+                <a:sym typeface="Calibri"/>
+              </a:rPr>
+              <a:t> </a:t>
+            </a:r>
+            <a:r>
+              <a:rPr lang="nl-NL" altLang="nl-NL" sz="1600" dirty="0" smtClean="0">
+                <a:latin typeface="Calibri"/>
+                <a:ea typeface="Calibri"/>
+                <a:cs typeface="Calibri"/>
+                <a:sym typeface="Calibri"/>
+              </a:rPr>
+              <a:t>(</a:t>
+            </a:r>
+            <a:r>
+              <a:rPr lang="nl-NL" altLang="nl-NL" sz="1600" i="1" dirty="0" smtClean="0">
+                <a:latin typeface="Calibri"/>
+                <a:ea typeface="Calibri"/>
+                <a:cs typeface="Calibri"/>
+                <a:sym typeface="Calibri"/>
+              </a:rPr>
+              <a:t>wind </a:t>
+            </a:r>
+            <a:r>
+              <a:rPr lang="nl-NL" altLang="nl-NL" sz="1600" i="1" dirty="0" err="1" smtClean="0">
+                <a:latin typeface="Calibri"/>
+                <a:ea typeface="Calibri"/>
+                <a:cs typeface="Calibri"/>
+                <a:sym typeface="Calibri"/>
+              </a:rPr>
+              <a:t>from</a:t>
+            </a:r>
+            <a:r>
+              <a:rPr lang="nl-NL" altLang="nl-NL" sz="1600" i="1" dirty="0" smtClean="0">
+                <a:latin typeface="Calibri"/>
+                <a:ea typeface="Calibri"/>
+                <a:cs typeface="Calibri"/>
+                <a:sym typeface="Calibri"/>
+              </a:rPr>
+              <a:t> </a:t>
+            </a:r>
+            <a:r>
+              <a:rPr lang="nl-NL" altLang="nl-NL" sz="1600" i="1" dirty="0" err="1" smtClean="0">
+                <a:latin typeface="Calibri"/>
+                <a:ea typeface="Calibri"/>
+                <a:cs typeface="Calibri"/>
+                <a:sym typeface="Calibri"/>
+              </a:rPr>
+              <a:t>ocean</a:t>
+            </a:r>
+            <a:r>
+              <a:rPr lang="nl-NL" altLang="nl-NL" sz="1600" i="1" dirty="0" smtClean="0">
+                <a:latin typeface="Calibri"/>
+                <a:ea typeface="Calibri"/>
+                <a:cs typeface="Calibri"/>
+                <a:sym typeface="Calibri"/>
+              </a:rPr>
+              <a:t> </a:t>
+            </a:r>
+            <a:r>
+              <a:rPr lang="nl-NL" altLang="nl-NL" sz="1600" i="1" dirty="0" err="1" smtClean="0">
+                <a:latin typeface="Calibri"/>
+                <a:ea typeface="Calibri"/>
+                <a:cs typeface="Calibri"/>
+                <a:sym typeface="Calibri"/>
+              </a:rPr>
+              <a:t>cools</a:t>
+            </a:r>
+            <a:r>
+              <a:rPr lang="nl-NL" altLang="nl-NL" sz="1600" i="1" dirty="0" smtClean="0">
+                <a:latin typeface="Calibri"/>
+                <a:ea typeface="Calibri"/>
+                <a:cs typeface="Calibri"/>
+                <a:sym typeface="Calibri"/>
+              </a:rPr>
+              <a:t> down the </a:t>
+            </a:r>
+            <a:r>
+              <a:rPr lang="nl-NL" altLang="nl-NL" sz="1600" i="1" dirty="0" err="1" smtClean="0">
+                <a:latin typeface="Calibri"/>
+                <a:ea typeface="Calibri"/>
+                <a:cs typeface="Calibri"/>
+                <a:sym typeface="Calibri"/>
+              </a:rPr>
+              <a:t>near</a:t>
+            </a:r>
+            <a:r>
+              <a:rPr lang="nl-NL" altLang="nl-NL" sz="1600" i="1" dirty="0" smtClean="0">
+                <a:latin typeface="Calibri"/>
+                <a:ea typeface="Calibri"/>
+                <a:cs typeface="Calibri"/>
+                <a:sym typeface="Calibri"/>
+              </a:rPr>
+              <a:t> </a:t>
+            </a:r>
+            <a:r>
+              <a:rPr lang="nl-NL" altLang="nl-NL" sz="1600" i="1" dirty="0" err="1" smtClean="0">
+                <a:latin typeface="Calibri"/>
+                <a:ea typeface="Calibri"/>
+                <a:cs typeface="Calibri"/>
+                <a:sym typeface="Calibri"/>
+              </a:rPr>
+              <a:t>surface</a:t>
+            </a:r>
+            <a:r>
+              <a:rPr lang="nl-NL" altLang="nl-NL" sz="1600" i="1" dirty="0" smtClean="0">
+                <a:latin typeface="Calibri"/>
+                <a:ea typeface="Calibri"/>
+                <a:cs typeface="Calibri"/>
+                <a:sym typeface="Calibri"/>
+              </a:rPr>
+              <a:t> </a:t>
+            </a:r>
+            <a:r>
+              <a:rPr lang="nl-NL" altLang="nl-NL" sz="1600" i="1" dirty="0" err="1" smtClean="0">
+                <a:latin typeface="Calibri"/>
+                <a:ea typeface="Calibri"/>
+                <a:cs typeface="Calibri"/>
+                <a:sym typeface="Calibri"/>
+              </a:rPr>
+              <a:t>temperature</a:t>
+            </a:r>
+            <a:r>
+              <a:rPr lang="nl-NL" altLang="nl-NL" sz="1600" i="1" dirty="0" smtClean="0">
+                <a:latin typeface="Calibri"/>
+                <a:ea typeface="Calibri"/>
+                <a:cs typeface="Calibri"/>
+                <a:sym typeface="Calibri"/>
+              </a:rPr>
+              <a:t> in </a:t>
+            </a:r>
+            <a:r>
+              <a:rPr lang="nl-NL" altLang="nl-NL" sz="1600" i="1" dirty="0" err="1" smtClean="0">
+                <a:latin typeface="Calibri"/>
+                <a:ea typeface="Calibri"/>
+                <a:cs typeface="Calibri"/>
+                <a:sym typeface="Calibri"/>
+              </a:rPr>
+              <a:t>summer</a:t>
+            </a:r>
+            <a:r>
+              <a:rPr lang="nl-NL" altLang="nl-NL" sz="1600" i="1" dirty="0" smtClean="0">
+                <a:latin typeface="Calibri"/>
+                <a:ea typeface="Calibri"/>
+                <a:cs typeface="Calibri"/>
+                <a:sym typeface="Calibri"/>
+              </a:rPr>
+              <a:t>/spring (</a:t>
+            </a:r>
+            <a:r>
+              <a:rPr lang="nl-NL" altLang="nl-NL" sz="1600" i="1" dirty="0" err="1" smtClean="0">
+                <a:latin typeface="Calibri"/>
+                <a:ea typeface="Calibri"/>
+                <a:cs typeface="Calibri"/>
+                <a:sym typeface="Calibri"/>
+              </a:rPr>
+              <a:t>negative</a:t>
+            </a:r>
+            <a:r>
+              <a:rPr lang="nl-NL" altLang="nl-NL" sz="1600" i="1" dirty="0" smtClean="0">
+                <a:latin typeface="Calibri"/>
+                <a:ea typeface="Calibri"/>
+                <a:cs typeface="Calibri"/>
+                <a:sym typeface="Calibri"/>
+              </a:rPr>
+              <a:t> </a:t>
+            </a:r>
+            <a:r>
+              <a:rPr lang="nl-NL" altLang="nl-NL" sz="1600" i="1" dirty="0" err="1" smtClean="0">
+                <a:latin typeface="Calibri"/>
+                <a:ea typeface="Calibri"/>
+                <a:cs typeface="Calibri"/>
+                <a:sym typeface="Calibri"/>
+              </a:rPr>
+              <a:t>correlation</a:t>
+            </a:r>
+            <a:r>
+              <a:rPr lang="nl-NL" altLang="nl-NL" sz="1600" i="1" dirty="0" smtClean="0">
+                <a:latin typeface="Calibri"/>
+                <a:ea typeface="Calibri"/>
+                <a:cs typeface="Calibri"/>
+                <a:sym typeface="Calibri"/>
+              </a:rPr>
+              <a:t>), heats up </a:t>
+            </a:r>
+            <a:r>
+              <a:rPr lang="nl-NL" altLang="nl-NL" sz="1600" i="1" dirty="0" err="1" smtClean="0">
+                <a:latin typeface="Calibri"/>
+                <a:ea typeface="Calibri"/>
+                <a:cs typeface="Calibri"/>
+                <a:sym typeface="Calibri"/>
+              </a:rPr>
+              <a:t>temperature</a:t>
+            </a:r>
+            <a:r>
+              <a:rPr lang="nl-NL" altLang="nl-NL" sz="1600" i="1" dirty="0" smtClean="0">
+                <a:latin typeface="Calibri"/>
+                <a:ea typeface="Calibri"/>
+                <a:cs typeface="Calibri"/>
+                <a:sym typeface="Calibri"/>
+              </a:rPr>
+              <a:t> in winter (</a:t>
+            </a:r>
+            <a:r>
+              <a:rPr lang="nl-NL" altLang="nl-NL" sz="1600" i="1" dirty="0" err="1" smtClean="0">
+                <a:latin typeface="Calibri"/>
+                <a:ea typeface="Calibri"/>
+                <a:cs typeface="Calibri"/>
+                <a:sym typeface="Calibri"/>
+              </a:rPr>
+              <a:t>positive</a:t>
+            </a:r>
+            <a:r>
+              <a:rPr lang="nl-NL" altLang="nl-NL" sz="1600" i="1" dirty="0" smtClean="0">
+                <a:latin typeface="Calibri"/>
+                <a:ea typeface="Calibri"/>
+                <a:cs typeface="Calibri"/>
+                <a:sym typeface="Calibri"/>
+              </a:rPr>
+              <a:t> </a:t>
+            </a:r>
+            <a:r>
+              <a:rPr lang="nl-NL" altLang="nl-NL" sz="1600" i="1" dirty="0" err="1" smtClean="0">
+                <a:latin typeface="Calibri"/>
+                <a:ea typeface="Calibri"/>
+                <a:cs typeface="Calibri"/>
+                <a:sym typeface="Calibri"/>
+              </a:rPr>
+              <a:t>correlation</a:t>
+            </a:r>
+            <a:r>
+              <a:rPr lang="nl-NL" altLang="nl-NL" sz="1600" i="1" dirty="0" smtClean="0">
+                <a:latin typeface="Calibri"/>
+                <a:ea typeface="Calibri"/>
+                <a:cs typeface="Calibri"/>
+                <a:sym typeface="Calibri"/>
+              </a:rPr>
+              <a:t>)</a:t>
+            </a:r>
+            <a:br>
+              <a:rPr lang="nl-NL" altLang="nl-NL" sz="1600" i="1" dirty="0" smtClean="0">
+                <a:latin typeface="Calibri"/>
+                <a:ea typeface="Calibri"/>
+                <a:cs typeface="Calibri"/>
+                <a:sym typeface="Calibri"/>
+              </a:rPr>
+            </a:br>
+            <a:r>
+              <a:rPr lang="nl-NL" altLang="nl-NL" sz="1600" dirty="0" smtClean="0">
+                <a:latin typeface="Calibri"/>
+                <a:ea typeface="Calibri"/>
+                <a:cs typeface="Calibri"/>
+                <a:sym typeface="Calibri"/>
+              </a:rPr>
+              <a:t>- </a:t>
+            </a:r>
+            <a:r>
+              <a:rPr lang="nl-NL" altLang="nl-NL" sz="1600" dirty="0" err="1" smtClean="0">
+                <a:latin typeface="Calibri"/>
+                <a:ea typeface="Calibri"/>
+                <a:cs typeface="Calibri"/>
+                <a:sym typeface="Calibri"/>
+              </a:rPr>
+              <a:t>cloud</a:t>
+            </a:r>
+            <a:r>
+              <a:rPr lang="nl-NL" altLang="nl-NL" sz="1600" dirty="0" smtClean="0">
+                <a:latin typeface="Calibri"/>
+                <a:ea typeface="Calibri"/>
+                <a:cs typeface="Calibri"/>
+                <a:sym typeface="Calibri"/>
+              </a:rPr>
+              <a:t> cover </a:t>
+            </a:r>
+            <a:r>
+              <a:rPr lang="nl-NL" altLang="nl-NL" sz="1600" dirty="0" err="1" smtClean="0">
+                <a:latin typeface="Calibri"/>
+                <a:ea typeface="Calibri"/>
+                <a:cs typeface="Calibri"/>
+                <a:sym typeface="Calibri"/>
+              </a:rPr>
+              <a:t>and</a:t>
+            </a:r>
+            <a:r>
+              <a:rPr lang="nl-NL" altLang="nl-NL" sz="1600" dirty="0" smtClean="0">
+                <a:latin typeface="Calibri"/>
+                <a:ea typeface="Calibri"/>
+                <a:cs typeface="Calibri"/>
+                <a:sym typeface="Calibri"/>
+              </a:rPr>
+              <a:t> </a:t>
+            </a:r>
+            <a:r>
+              <a:rPr lang="nl-NL" altLang="nl-NL" sz="1600" dirty="0" err="1" smtClean="0">
+                <a:latin typeface="Calibri"/>
+                <a:ea typeface="Calibri"/>
+                <a:cs typeface="Calibri"/>
+                <a:sym typeface="Calibri"/>
+              </a:rPr>
+              <a:t>temperature</a:t>
+            </a:r>
+            <a:r>
+              <a:rPr lang="nl-NL" altLang="nl-NL" sz="1600" dirty="0" smtClean="0">
+                <a:latin typeface="Calibri"/>
+                <a:ea typeface="Calibri"/>
+                <a:cs typeface="Calibri"/>
+                <a:sym typeface="Calibri"/>
+              </a:rPr>
+              <a:t> </a:t>
+            </a:r>
+            <a:r>
+              <a:rPr lang="nl-NL" altLang="nl-NL" sz="1600" dirty="0" err="1" smtClean="0">
+                <a:latin typeface="Calibri"/>
+                <a:ea typeface="Calibri"/>
+                <a:cs typeface="Calibri"/>
+                <a:sym typeface="Calibri"/>
+              </a:rPr>
+              <a:t>above</a:t>
+            </a:r>
+            <a:r>
+              <a:rPr lang="nl-NL" altLang="nl-NL" sz="1600" dirty="0" smtClean="0">
+                <a:latin typeface="Calibri"/>
+                <a:ea typeface="Calibri"/>
+                <a:cs typeface="Calibri"/>
+                <a:sym typeface="Calibri"/>
+              </a:rPr>
+              <a:t> </a:t>
+            </a:r>
+            <a:r>
+              <a:rPr lang="nl-NL" altLang="nl-NL" sz="1600" smtClean="0">
+                <a:latin typeface="Calibri"/>
+                <a:ea typeface="Calibri"/>
+                <a:cs typeface="Calibri"/>
+                <a:sym typeface="Calibri"/>
+              </a:rPr>
+              <a:t>surface</a:t>
+            </a:r>
+            <a:endParaRPr dirty="0">
               <a:latin typeface="Calibri"/>
               <a:ea typeface="Calibri"/>
               <a:cs typeface="Calibri"/>
@@ -17290,18 +18386,17 @@
           <p:cNvPicPr preferRelativeResize="0"/>
           <p:nvPr/>
         </p:nvPicPr>
-        <p:blipFill>
+        <p:blipFill rotWithShape="1">
           <a:blip r:embed="rId3">
             <a:alphaModFix/>
           </a:blip>
-          <a:stretch>
-            <a:fillRect/>
-          </a:stretch>
+          <a:srcRect l="10662"/>
+          <a:stretch/>
         </p:blipFill>
         <p:spPr>
           <a:xfrm>
-            <a:off x="1849375" y="674300"/>
-            <a:ext cx="9583852" cy="3043650"/>
+            <a:off x="2871215" y="674300"/>
+            <a:ext cx="8562011" cy="3043650"/>
           </a:xfrm>
           <a:prstGeom prst="rect">
             <a:avLst/>
@@ -17318,18 +18413,17 @@
           <p:cNvPicPr preferRelativeResize="0"/>
           <p:nvPr/>
         </p:nvPicPr>
-        <p:blipFill>
+        <p:blipFill rotWithShape="1">
           <a:blip r:embed="rId4">
             <a:alphaModFix/>
           </a:blip>
-          <a:stretch>
-            <a:fillRect/>
-          </a:stretch>
+          <a:srcRect l="9823"/>
+          <a:stretch/>
         </p:blipFill>
         <p:spPr>
           <a:xfrm>
-            <a:off x="1999358" y="3556124"/>
-            <a:ext cx="9433879" cy="3301875"/>
+            <a:off x="2926080" y="3556124"/>
+            <a:ext cx="8507157" cy="3301875"/>
           </a:xfrm>
           <a:prstGeom prst="rect">
             <a:avLst/>
@@ -17610,7 +18704,7 @@
         </p:blipFill>
         <p:spPr>
           <a:xfrm>
-            <a:off x="2020064" y="684296"/>
+            <a:off x="2149022" y="330825"/>
             <a:ext cx="9134550" cy="3112449"/>
           </a:xfrm>
           <a:prstGeom prst="rect">

</xml_diff>